<commit_message>
Incorporation of review comments (terminology)
</commit_message>
<xml_diff>
--- a/presentations/slides-111-BRSKI-AE.pptx
+++ b/presentations/slides-111-BRSKI-AE.pptx
@@ -258,7 +258,7 @@
           <a:p>
             <a:fld id="{33B5B5E8-CA78-4A82-83A0-867EF5A818AE}" type="datetimeFigureOut">
               <a:rPr lang="en-US" smtClean="0"/>
-              <a:t>7/17/2021</a:t>
+              <a:t>7/20/2021</a:t>
             </a:fld>
             <a:endParaRPr lang="en-US"/>
           </a:p>
@@ -2583,7 +2583,7 @@
           <a:p>
             <a:fld id="{8C792E63-5F21-4F54-A864-D84D9F273FCA}" type="datetimeFigureOut">
               <a:rPr lang="en-US" smtClean="0"/>
-              <a:t>7/17/2021</a:t>
+              <a:t>7/20/2021</a:t>
             </a:fld>
             <a:endParaRPr lang="en-US" dirty="0"/>
           </a:p>
@@ -2801,7 +2801,7 @@
           <a:p>
             <a:fld id="{8C792E63-5F21-4F54-A864-D84D9F273FCA}" type="datetimeFigureOut">
               <a:rPr lang="en-US" smtClean="0"/>
-              <a:t>7/17/2021</a:t>
+              <a:t>7/20/2021</a:t>
             </a:fld>
             <a:endParaRPr lang="en-US"/>
           </a:p>
@@ -3025,7 +3025,7 @@
           <a:p>
             <a:fld id="{8C792E63-5F21-4F54-A864-D84D9F273FCA}" type="datetimeFigureOut">
               <a:rPr lang="en-US" smtClean="0"/>
-              <a:t>7/17/2021</a:t>
+              <a:t>7/20/2021</a:t>
             </a:fld>
             <a:endParaRPr lang="en-US"/>
           </a:p>
@@ -3239,7 +3239,7 @@
           <a:p>
             <a:fld id="{8C792E63-5F21-4F54-A864-D84D9F273FCA}" type="datetimeFigureOut">
               <a:rPr lang="en-US" smtClean="0"/>
-              <a:t>7/17/2021</a:t>
+              <a:t>7/20/2021</a:t>
             </a:fld>
             <a:endParaRPr lang="en-US"/>
           </a:p>
@@ -3530,7 +3530,7 @@
           <a:p>
             <a:fld id="{8C792E63-5F21-4F54-A864-D84D9F273FCA}" type="datetimeFigureOut">
               <a:rPr lang="en-US" smtClean="0"/>
-              <a:t>7/17/2021</a:t>
+              <a:t>7/20/2021</a:t>
             </a:fld>
             <a:endParaRPr lang="en-US"/>
           </a:p>
@@ -3811,7 +3811,7 @@
           <a:p>
             <a:fld id="{8C792E63-5F21-4F54-A864-D84D9F273FCA}" type="datetimeFigureOut">
               <a:rPr lang="en-US" smtClean="0"/>
-              <a:t>7/17/2021</a:t>
+              <a:t>7/20/2021</a:t>
             </a:fld>
             <a:endParaRPr lang="en-US"/>
           </a:p>
@@ -4239,7 +4239,7 @@
           <a:p>
             <a:fld id="{8C792E63-5F21-4F54-A864-D84D9F273FCA}" type="datetimeFigureOut">
               <a:rPr lang="en-US" smtClean="0"/>
-              <a:t>7/17/2021</a:t>
+              <a:t>7/20/2021</a:t>
             </a:fld>
             <a:endParaRPr lang="en-US"/>
           </a:p>
@@ -4396,7 +4396,7 @@
           <a:p>
             <a:fld id="{8C792E63-5F21-4F54-A864-D84D9F273FCA}" type="datetimeFigureOut">
               <a:rPr lang="en-US" smtClean="0"/>
-              <a:t>7/17/2021</a:t>
+              <a:t>7/20/2021</a:t>
             </a:fld>
             <a:endParaRPr lang="en-US"/>
           </a:p>
@@ -4525,7 +4525,7 @@
           <a:p>
             <a:fld id="{8C792E63-5F21-4F54-A864-D84D9F273FCA}" type="datetimeFigureOut">
               <a:rPr lang="en-US" smtClean="0"/>
-              <a:t>7/17/2021</a:t>
+              <a:t>7/20/2021</a:t>
             </a:fld>
             <a:endParaRPr lang="en-US"/>
           </a:p>
@@ -4852,7 +4852,7 @@
           <a:p>
             <a:fld id="{8C792E63-5F21-4F54-A864-D84D9F273FCA}" type="datetimeFigureOut">
               <a:rPr lang="en-US" smtClean="0"/>
-              <a:t>7/17/2021</a:t>
+              <a:t>7/20/2021</a:t>
             </a:fld>
             <a:endParaRPr lang="en-US"/>
           </a:p>
@@ -5156,7 +5156,7 @@
           <a:p>
             <a:fld id="{8C792E63-5F21-4F54-A864-D84D9F273FCA}" type="datetimeFigureOut">
               <a:rPr lang="en-US" smtClean="0"/>
-              <a:t>7/17/2021</a:t>
+              <a:t>7/20/2021</a:t>
             </a:fld>
             <a:endParaRPr lang="en-US"/>
           </a:p>
@@ -5448,7 +5448,7 @@
           <a:p>
             <a:fld id="{8C792E63-5F21-4F54-A864-D84D9F273FCA}" type="datetimeFigureOut">
               <a:rPr lang="en-US" smtClean="0"/>
-              <a:t>7/17/2021</a:t>
+              <a:t>7/20/2021</a:t>
             </a:fld>
             <a:endParaRPr lang="en-US"/>
           </a:p>
@@ -7296,7 +7296,7 @@
             <a:fld id="{8C792E63-5F21-4F54-A864-D84D9F273FCA}" type="datetimeFigureOut">
               <a:rPr lang="en-US" smtClean="0"/>
               <a:pPr/>
-              <a:t>7/17/2021</a:t>
+              <a:t>7/20/2021</a:t>
             </a:fld>
             <a:endParaRPr lang="en-US" dirty="0"/>
           </a:p>
@@ -9351,7 +9351,7 @@
             <a:fld id="{8C792E63-5F21-4F54-A864-D84D9F273FCA}" type="datetimeFigureOut">
               <a:rPr lang="en-US" smtClean="0"/>
               <a:pPr/>
-              <a:t>7/17/2021</a:t>
+              <a:t>7/20/2021</a:t>
             </a:fld>
             <a:endParaRPr lang="en-US" dirty="0"/>
           </a:p>
@@ -10514,7 +10514,7 @@
             <a:fld id="{8C792E63-5F21-4F54-A864-D84D9F273FCA}" type="datetimeFigureOut">
               <a:rPr lang="en-US" smtClean="0"/>
               <a:pPr/>
-              <a:t>7/17/2021</a:t>
+              <a:t>7/20/2021</a:t>
             </a:fld>
             <a:endParaRPr lang="en-US" dirty="0"/>
           </a:p>
@@ -12219,7 +12219,7 @@
             <a:fld id="{8C792E63-5F21-4F54-A864-D84D9F273FCA}" type="datetimeFigureOut">
               <a:rPr lang="en-US" smtClean="0"/>
               <a:pPr/>
-              <a:t>7/17/2021</a:t>
+              <a:t>7/20/2021</a:t>
             </a:fld>
             <a:endParaRPr lang="en-US" dirty="0"/>
           </a:p>
@@ -14086,7 +14086,7 @@
             <a:fld id="{8C792E63-5F21-4F54-A864-D84D9F273FCA}" type="datetimeFigureOut">
               <a:rPr lang="en-US" smtClean="0"/>
               <a:pPr/>
-              <a:t>7/17/2021</a:t>
+              <a:t>7/20/2021</a:t>
             </a:fld>
             <a:endParaRPr lang="en-US" dirty="0"/>
           </a:p>
@@ -15334,7 +15334,7 @@
             <a:fld id="{8C792E63-5F21-4F54-A864-D84D9F273FCA}" type="datetimeFigureOut">
               <a:rPr lang="en-US" smtClean="0"/>
               <a:pPr/>
-              <a:t>7/17/2021</a:t>
+              <a:t>7/20/2021</a:t>
             </a:fld>
             <a:endParaRPr lang="en-US" dirty="0"/>
           </a:p>
@@ -16582,7 +16582,7 @@
             <a:fld id="{8C792E63-5F21-4F54-A864-D84D9F273FCA}" type="datetimeFigureOut">
               <a:rPr lang="en-US" smtClean="0"/>
               <a:pPr/>
-              <a:t>7/17/2021</a:t>
+              <a:t>7/20/2021</a:t>
             </a:fld>
             <a:endParaRPr lang="en-US" dirty="0"/>
           </a:p>
@@ -18228,7 +18228,7 @@
             <a:fld id="{8C792E63-5F21-4F54-A864-D84D9F273FCA}" type="datetimeFigureOut">
               <a:rPr lang="en-US" smtClean="0"/>
               <a:pPr/>
-              <a:t>7/17/2021</a:t>
+              <a:t>7/20/2021</a:t>
             </a:fld>
             <a:endParaRPr lang="en-US" dirty="0"/>
           </a:p>
@@ -19523,7 +19523,7 @@
             <a:fld id="{8C792E63-5F21-4F54-A864-D84D9F273FCA}" type="datetimeFigureOut">
               <a:rPr lang="en-US" smtClean="0"/>
               <a:pPr/>
-              <a:t>7/17/2021</a:t>
+              <a:t>7/20/2021</a:t>
             </a:fld>
             <a:endParaRPr lang="en-US" dirty="0"/>
           </a:p>
@@ -20766,7 +20766,7 @@
             <a:fld id="{8C792E63-5F21-4F54-A864-D84D9F273FCA}" type="datetimeFigureOut">
               <a:rPr lang="en-US" smtClean="0"/>
               <a:pPr/>
-              <a:t>7/17/2021</a:t>
+              <a:t>7/20/2021</a:t>
             </a:fld>
             <a:endParaRPr lang="en-US" dirty="0"/>
           </a:p>
@@ -21206,7 +21206,7 @@
             <a:fld id="{8C792E63-5F21-4F54-A864-D84D9F273FCA}" type="datetimeFigureOut">
               <a:rPr lang="en-US" smtClean="0"/>
               <a:pPr/>
-              <a:t>7/17/2021</a:t>
+              <a:t>7/20/2021</a:t>
             </a:fld>
             <a:endParaRPr lang="en-US" dirty="0"/>
           </a:p>
@@ -22449,7 +22449,7 @@
             <a:fld id="{8C792E63-5F21-4F54-A864-D84D9F273FCA}" type="datetimeFigureOut">
               <a:rPr lang="en-US" smtClean="0"/>
               <a:pPr/>
-              <a:t>7/17/2021</a:t>
+              <a:t>7/20/2021</a:t>
             </a:fld>
             <a:endParaRPr lang="en-US" dirty="0"/>
           </a:p>
@@ -23361,7 +23361,7 @@
             <a:fld id="{8C792E63-5F21-4F54-A864-D84D9F273FCA}" type="datetimeFigureOut">
               <a:rPr lang="en-US" smtClean="0"/>
               <a:pPr/>
-              <a:t>7/17/2021</a:t>
+              <a:t>7/20/2021</a:t>
             </a:fld>
             <a:endParaRPr lang="en-US" dirty="0"/>
           </a:p>
@@ -24408,7 +24408,7 @@
             <a:fld id="{8C792E63-5F21-4F54-A864-D84D9F273FCA}" type="datetimeFigureOut">
               <a:rPr lang="en-US" smtClean="0"/>
               <a:pPr/>
-              <a:t>7/17/2021</a:t>
+              <a:t>7/20/2021</a:t>
             </a:fld>
             <a:endParaRPr lang="en-US" dirty="0"/>
           </a:p>
@@ -25593,7 +25593,7 @@
             <a:fld id="{8C792E63-5F21-4F54-A864-D84D9F273FCA}" type="datetimeFigureOut">
               <a:rPr lang="en-US" smtClean="0"/>
               <a:pPr/>
-              <a:t>7/17/2021</a:t>
+              <a:t>7/20/2021</a:t>
             </a:fld>
             <a:endParaRPr lang="en-US" dirty="0"/>
           </a:p>
@@ -26057,7 +26057,7 @@
             <a:fld id="{8C792E63-5F21-4F54-A864-D84D9F273FCA}" type="datetimeFigureOut">
               <a:rPr lang="en-US" smtClean="0"/>
               <a:pPr/>
-              <a:t>7/17/2021</a:t>
+              <a:t>7/20/2021</a:t>
             </a:fld>
             <a:endParaRPr lang="en-US" dirty="0"/>
           </a:p>
@@ -26549,7 +26549,7 @@
             <a:fld id="{8C792E63-5F21-4F54-A864-D84D9F273FCA}" type="datetimeFigureOut">
               <a:rPr lang="en-US" smtClean="0"/>
               <a:pPr/>
-              <a:t>7/17/2021</a:t>
+              <a:t>7/20/2021</a:t>
             </a:fld>
             <a:endParaRPr lang="en-US" dirty="0"/>
           </a:p>
@@ -26799,7 +26799,15 @@
             </a:pPr>
             <a:r>
               <a:rPr lang="en-US" sz="2000" dirty="0"/>
-              <a:t>Use Case 1 targets the definition of requirements for a communication architecture using the existing BRSKI components and call model (pledge as initiator, PULL) to enable the use of alternative enrollment protocols for certificate enrollment (voucher handling untouched).  </a:t>
+              <a:t>Use Case 1 targets the definition of requirements for a communication architecture using the existing BRSKI components and call model (pledge-initiator-mode</a:t>
+            </a:r>
+            <a:r>
+              <a:rPr lang="en-US" sz="2000"/>
+              <a:t>, formerly </a:t>
+            </a:r>
+            <a:r>
+              <a:rPr lang="en-US" sz="2000" dirty="0"/>
+              <a:t>PULL) to enable the use of alternative enrollment protocols for certificate enrollment (voucher handling untouched).  </a:t>
             </a:r>
           </a:p>
           <a:p>
@@ -26813,7 +26821,7 @@
             </a:pPr>
             <a:r>
               <a:rPr lang="en-US" sz="2000" dirty="0"/>
-              <a:t>Use Case 2 targets the specification of a reversed call model (pledge as responder, PUSH) in which the pledge has no or only limited connectivity to a registrar or cannot initiate requests to a registrar. To facilitate the interaction between pledge and registrar, the registrar-agent component is established. The interaction between pledge and registrar-agent results in new or enhanced data objects (voucher-request-trigger, voucher-request, voucher, enrollment-request-trigger, enrollment-request). Exchanges between registrar-agent and registrar follow</a:t>
+              <a:t>Use Case 2 targets the specification of a reversed call model (pledge-responder-mode, formerly PUSH) in which the pledge has no or only limited connectivity to a registrar or cannot initiate requests to a registrar. To facilitate the interaction between pledge and registrar, the registrar-agent component is established. The interaction between pledge and registrar-agent results in new or enhanced data objects (voucher-request-trigger, voucher-request, voucher, enrollment-request-trigger, enrollment-request). Exchanges between registrar-agent and registrar follow</a:t>
             </a:r>
             <a:r>
               <a:rPr lang="en-US" sz="2000" strike="sngStrike" dirty="0"/>
@@ -26994,7 +27002,7 @@
             <a:fld id="{8C792E63-5F21-4F54-A864-D84D9F273FCA}" type="datetimeFigureOut">
               <a:rPr lang="en-US" smtClean="0"/>
               <a:pPr/>
-              <a:t>7/17/2021</a:t>
+              <a:t>7/20/2021</a:t>
             </a:fld>
             <a:endParaRPr lang="en-US" dirty="0"/>
           </a:p>
@@ -27411,7 +27419,7 @@
             <a:fld id="{8C792E63-5F21-4F54-A864-D84D9F273FCA}" type="datetimeFigureOut">
               <a:rPr lang="en-US" smtClean="0"/>
               <a:pPr/>
-              <a:t>7/17/2021</a:t>
+              <a:t>7/20/2021</a:t>
             </a:fld>
             <a:endParaRPr lang="en-US" dirty="0"/>
           </a:p>
@@ -32156,7 +32164,7 @@
             <a:fld id="{8C792E63-5F21-4F54-A864-D84D9F273FCA}" type="datetimeFigureOut">
               <a:rPr lang="en-US" smtClean="0"/>
               <a:pPr/>
-              <a:t>7/17/2021</a:t>
+              <a:t>7/20/2021</a:t>
             </a:fld>
             <a:endParaRPr lang="en-US"/>
           </a:p>
@@ -37671,7 +37679,7 @@
             <a:fld id="{8C792E63-5F21-4F54-A864-D84D9F273FCA}" type="datetimeFigureOut">
               <a:rPr lang="en-US" smtClean="0"/>
               <a:pPr/>
-              <a:t>7/17/2021</a:t>
+              <a:t>7/20/2021</a:t>
             </a:fld>
             <a:endParaRPr lang="en-US" dirty="0"/>
           </a:p>
@@ -38002,7 +38010,7 @@
             <a:fld id="{8C792E63-5F21-4F54-A864-D84D9F273FCA}" type="datetimeFigureOut">
               <a:rPr lang="en-US" smtClean="0"/>
               <a:pPr/>
-              <a:t>7/19/2021</a:t>
+              <a:t>7/20/2021</a:t>
             </a:fld>
             <a:endParaRPr lang="en-US" dirty="0"/>
           </a:p>
@@ -39657,7 +39665,7 @@
             <a:fld id="{8C792E63-5F21-4F54-A864-D84D9F273FCA}" type="datetimeFigureOut">
               <a:rPr lang="en-US" smtClean="0"/>
               <a:pPr/>
-              <a:t>7/17/2021</a:t>
+              <a:t>7/20/2021</a:t>
             </a:fld>
             <a:endParaRPr lang="en-US" dirty="0"/>
           </a:p>
@@ -40764,7 +40772,7 @@
             <a:fld id="{8C792E63-5F21-4F54-A864-D84D9F273FCA}" type="datetimeFigureOut">
               <a:rPr lang="en-US" smtClean="0"/>
               <a:pPr/>
-              <a:t>7/17/2021</a:t>
+              <a:t>7/20/2021</a:t>
             </a:fld>
             <a:endParaRPr lang="en-US" dirty="0"/>
           </a:p>
@@ -42038,7 +42046,7 @@
             <a:fld id="{8C792E63-5F21-4F54-A864-D84D9F273FCA}" type="datetimeFigureOut">
               <a:rPr lang="en-US" smtClean="0"/>
               <a:pPr/>
-              <a:t>7/17/2021</a:t>
+              <a:t>7/20/2021</a:t>
             </a:fld>
             <a:endParaRPr lang="en-US" dirty="0"/>
           </a:p>

</xml_diff>

<commit_message>
Update next steps slide with draft split
</commit_message>
<xml_diff>
--- a/presentations/slides-111-BRSKI-AE.pptx
+++ b/presentations/slides-111-BRSKI-AE.pptx
@@ -258,7 +258,7 @@
           <a:p>
             <a:fld id="{33B5B5E8-CA78-4A82-83A0-867EF5A818AE}" type="datetimeFigureOut">
               <a:rPr lang="en-US" smtClean="0"/>
-              <a:t>7/20/2021</a:t>
+              <a:t>7/21/2021</a:t>
             </a:fld>
             <a:endParaRPr lang="en-US"/>
           </a:p>
@@ -2583,7 +2583,7 @@
           <a:p>
             <a:fld id="{8C792E63-5F21-4F54-A864-D84D9F273FCA}" type="datetimeFigureOut">
               <a:rPr lang="en-US" smtClean="0"/>
-              <a:t>7/20/2021</a:t>
+              <a:t>7/21/2021</a:t>
             </a:fld>
             <a:endParaRPr lang="en-US" dirty="0"/>
           </a:p>
@@ -2801,7 +2801,7 @@
           <a:p>
             <a:fld id="{8C792E63-5F21-4F54-A864-D84D9F273FCA}" type="datetimeFigureOut">
               <a:rPr lang="en-US" smtClean="0"/>
-              <a:t>7/20/2021</a:t>
+              <a:t>7/21/2021</a:t>
             </a:fld>
             <a:endParaRPr lang="en-US"/>
           </a:p>
@@ -3025,7 +3025,7 @@
           <a:p>
             <a:fld id="{8C792E63-5F21-4F54-A864-D84D9F273FCA}" type="datetimeFigureOut">
               <a:rPr lang="en-US" smtClean="0"/>
-              <a:t>7/20/2021</a:t>
+              <a:t>7/21/2021</a:t>
             </a:fld>
             <a:endParaRPr lang="en-US"/>
           </a:p>
@@ -3239,7 +3239,7 @@
           <a:p>
             <a:fld id="{8C792E63-5F21-4F54-A864-D84D9F273FCA}" type="datetimeFigureOut">
               <a:rPr lang="en-US" smtClean="0"/>
-              <a:t>7/20/2021</a:t>
+              <a:t>7/21/2021</a:t>
             </a:fld>
             <a:endParaRPr lang="en-US"/>
           </a:p>
@@ -3530,7 +3530,7 @@
           <a:p>
             <a:fld id="{8C792E63-5F21-4F54-A864-D84D9F273FCA}" type="datetimeFigureOut">
               <a:rPr lang="en-US" smtClean="0"/>
-              <a:t>7/20/2021</a:t>
+              <a:t>7/21/2021</a:t>
             </a:fld>
             <a:endParaRPr lang="en-US"/>
           </a:p>
@@ -3811,7 +3811,7 @@
           <a:p>
             <a:fld id="{8C792E63-5F21-4F54-A864-D84D9F273FCA}" type="datetimeFigureOut">
               <a:rPr lang="en-US" smtClean="0"/>
-              <a:t>7/20/2021</a:t>
+              <a:t>7/21/2021</a:t>
             </a:fld>
             <a:endParaRPr lang="en-US"/>
           </a:p>
@@ -4239,7 +4239,7 @@
           <a:p>
             <a:fld id="{8C792E63-5F21-4F54-A864-D84D9F273FCA}" type="datetimeFigureOut">
               <a:rPr lang="en-US" smtClean="0"/>
-              <a:t>7/20/2021</a:t>
+              <a:t>7/21/2021</a:t>
             </a:fld>
             <a:endParaRPr lang="en-US"/>
           </a:p>
@@ -4396,7 +4396,7 @@
           <a:p>
             <a:fld id="{8C792E63-5F21-4F54-A864-D84D9F273FCA}" type="datetimeFigureOut">
               <a:rPr lang="en-US" smtClean="0"/>
-              <a:t>7/20/2021</a:t>
+              <a:t>7/21/2021</a:t>
             </a:fld>
             <a:endParaRPr lang="en-US"/>
           </a:p>
@@ -4525,7 +4525,7 @@
           <a:p>
             <a:fld id="{8C792E63-5F21-4F54-A864-D84D9F273FCA}" type="datetimeFigureOut">
               <a:rPr lang="en-US" smtClean="0"/>
-              <a:t>7/20/2021</a:t>
+              <a:t>7/21/2021</a:t>
             </a:fld>
             <a:endParaRPr lang="en-US"/>
           </a:p>
@@ -4852,7 +4852,7 @@
           <a:p>
             <a:fld id="{8C792E63-5F21-4F54-A864-D84D9F273FCA}" type="datetimeFigureOut">
               <a:rPr lang="en-US" smtClean="0"/>
-              <a:t>7/20/2021</a:t>
+              <a:t>7/21/2021</a:t>
             </a:fld>
             <a:endParaRPr lang="en-US"/>
           </a:p>
@@ -5156,7 +5156,7 @@
           <a:p>
             <a:fld id="{8C792E63-5F21-4F54-A864-D84D9F273FCA}" type="datetimeFigureOut">
               <a:rPr lang="en-US" smtClean="0"/>
-              <a:t>7/20/2021</a:t>
+              <a:t>7/21/2021</a:t>
             </a:fld>
             <a:endParaRPr lang="en-US"/>
           </a:p>
@@ -5448,7 +5448,7 @@
           <a:p>
             <a:fld id="{8C792E63-5F21-4F54-A864-D84D9F273FCA}" type="datetimeFigureOut">
               <a:rPr lang="en-US" smtClean="0"/>
-              <a:t>7/20/2021</a:t>
+              <a:t>7/21/2021</a:t>
             </a:fld>
             <a:endParaRPr lang="en-US"/>
           </a:p>
@@ -7296,7 +7296,7 @@
             <a:fld id="{8C792E63-5F21-4F54-A864-D84D9F273FCA}" type="datetimeFigureOut">
               <a:rPr lang="en-US" smtClean="0"/>
               <a:pPr/>
-              <a:t>7/20/2021</a:t>
+              <a:t>7/21/2021</a:t>
             </a:fld>
             <a:endParaRPr lang="en-US" dirty="0"/>
           </a:p>
@@ -9351,7 +9351,7 @@
             <a:fld id="{8C792E63-5F21-4F54-A864-D84D9F273FCA}" type="datetimeFigureOut">
               <a:rPr lang="en-US" smtClean="0"/>
               <a:pPr/>
-              <a:t>7/20/2021</a:t>
+              <a:t>7/21/2021</a:t>
             </a:fld>
             <a:endParaRPr lang="en-US" dirty="0"/>
           </a:p>
@@ -10514,7 +10514,7 @@
             <a:fld id="{8C792E63-5F21-4F54-A864-D84D9F273FCA}" type="datetimeFigureOut">
               <a:rPr lang="en-US" smtClean="0"/>
               <a:pPr/>
-              <a:t>7/20/2021</a:t>
+              <a:t>7/21/2021</a:t>
             </a:fld>
             <a:endParaRPr lang="en-US" dirty="0"/>
           </a:p>
@@ -12219,7 +12219,7 @@
             <a:fld id="{8C792E63-5F21-4F54-A864-D84D9F273FCA}" type="datetimeFigureOut">
               <a:rPr lang="en-US" smtClean="0"/>
               <a:pPr/>
-              <a:t>7/20/2021</a:t>
+              <a:t>7/21/2021</a:t>
             </a:fld>
             <a:endParaRPr lang="en-US" dirty="0"/>
           </a:p>
@@ -14086,7 +14086,7 @@
             <a:fld id="{8C792E63-5F21-4F54-A864-D84D9F273FCA}" type="datetimeFigureOut">
               <a:rPr lang="en-US" smtClean="0"/>
               <a:pPr/>
-              <a:t>7/20/2021</a:t>
+              <a:t>7/21/2021</a:t>
             </a:fld>
             <a:endParaRPr lang="en-US" dirty="0"/>
           </a:p>
@@ -15334,7 +15334,7 @@
             <a:fld id="{8C792E63-5F21-4F54-A864-D84D9F273FCA}" type="datetimeFigureOut">
               <a:rPr lang="en-US" smtClean="0"/>
               <a:pPr/>
-              <a:t>7/20/2021</a:t>
+              <a:t>7/21/2021</a:t>
             </a:fld>
             <a:endParaRPr lang="en-US" dirty="0"/>
           </a:p>
@@ -16582,7 +16582,7 @@
             <a:fld id="{8C792E63-5F21-4F54-A864-D84D9F273FCA}" type="datetimeFigureOut">
               <a:rPr lang="en-US" smtClean="0"/>
               <a:pPr/>
-              <a:t>7/20/2021</a:t>
+              <a:t>7/21/2021</a:t>
             </a:fld>
             <a:endParaRPr lang="en-US" dirty="0"/>
           </a:p>
@@ -18228,7 +18228,7 @@
             <a:fld id="{8C792E63-5F21-4F54-A864-D84D9F273FCA}" type="datetimeFigureOut">
               <a:rPr lang="en-US" smtClean="0"/>
               <a:pPr/>
-              <a:t>7/20/2021</a:t>
+              <a:t>7/21/2021</a:t>
             </a:fld>
             <a:endParaRPr lang="en-US" dirty="0"/>
           </a:p>
@@ -19523,7 +19523,7 @@
             <a:fld id="{8C792E63-5F21-4F54-A864-D84D9F273FCA}" type="datetimeFigureOut">
               <a:rPr lang="en-US" smtClean="0"/>
               <a:pPr/>
-              <a:t>7/20/2021</a:t>
+              <a:t>7/21/2021</a:t>
             </a:fld>
             <a:endParaRPr lang="en-US" dirty="0"/>
           </a:p>
@@ -20766,7 +20766,7 @@
             <a:fld id="{8C792E63-5F21-4F54-A864-D84D9F273FCA}" type="datetimeFigureOut">
               <a:rPr lang="en-US" smtClean="0"/>
               <a:pPr/>
-              <a:t>7/20/2021</a:t>
+              <a:t>7/21/2021</a:t>
             </a:fld>
             <a:endParaRPr lang="en-US" dirty="0"/>
           </a:p>
@@ -21206,7 +21206,7 @@
             <a:fld id="{8C792E63-5F21-4F54-A864-D84D9F273FCA}" type="datetimeFigureOut">
               <a:rPr lang="en-US" smtClean="0"/>
               <a:pPr/>
-              <a:t>7/20/2021</a:t>
+              <a:t>7/21/2021</a:t>
             </a:fld>
             <a:endParaRPr lang="en-US" dirty="0"/>
           </a:p>
@@ -22449,7 +22449,7 @@
             <a:fld id="{8C792E63-5F21-4F54-A864-D84D9F273FCA}" type="datetimeFigureOut">
               <a:rPr lang="en-US" smtClean="0"/>
               <a:pPr/>
-              <a:t>7/20/2021</a:t>
+              <a:t>7/21/2021</a:t>
             </a:fld>
             <a:endParaRPr lang="en-US" dirty="0"/>
           </a:p>
@@ -23361,7 +23361,7 @@
             <a:fld id="{8C792E63-5F21-4F54-A864-D84D9F273FCA}" type="datetimeFigureOut">
               <a:rPr lang="en-US" smtClean="0"/>
               <a:pPr/>
-              <a:t>7/20/2021</a:t>
+              <a:t>7/21/2021</a:t>
             </a:fld>
             <a:endParaRPr lang="en-US" dirty="0"/>
           </a:p>
@@ -24408,7 +24408,7 @@
             <a:fld id="{8C792E63-5F21-4F54-A864-D84D9F273FCA}" type="datetimeFigureOut">
               <a:rPr lang="en-US" smtClean="0"/>
               <a:pPr/>
-              <a:t>7/20/2021</a:t>
+              <a:t>7/21/2021</a:t>
             </a:fld>
             <a:endParaRPr lang="en-US" dirty="0"/>
           </a:p>
@@ -25593,7 +25593,7 @@
             <a:fld id="{8C792E63-5F21-4F54-A864-D84D9F273FCA}" type="datetimeFigureOut">
               <a:rPr lang="en-US" smtClean="0"/>
               <a:pPr/>
-              <a:t>7/20/2021</a:t>
+              <a:t>7/21/2021</a:t>
             </a:fld>
             <a:endParaRPr lang="en-US" dirty="0"/>
           </a:p>
@@ -26057,7 +26057,7 @@
             <a:fld id="{8C792E63-5F21-4F54-A864-D84D9F273FCA}" type="datetimeFigureOut">
               <a:rPr lang="en-US" smtClean="0"/>
               <a:pPr/>
-              <a:t>7/20/2021</a:t>
+              <a:t>7/21/2021</a:t>
             </a:fld>
             <a:endParaRPr lang="en-US" dirty="0"/>
           </a:p>
@@ -26549,7 +26549,7 @@
             <a:fld id="{8C792E63-5F21-4F54-A864-D84D9F273FCA}" type="datetimeFigureOut">
               <a:rPr lang="en-US" smtClean="0"/>
               <a:pPr/>
-              <a:t>7/20/2021</a:t>
+              <a:t>7/21/2021</a:t>
             </a:fld>
             <a:endParaRPr lang="en-US" dirty="0"/>
           </a:p>
@@ -27002,7 +27002,7 @@
             <a:fld id="{8C792E63-5F21-4F54-A864-D84D9F273FCA}" type="datetimeFigureOut">
               <a:rPr lang="en-US" smtClean="0"/>
               <a:pPr/>
-              <a:t>7/20/2021</a:t>
+              <a:t>7/21/2021</a:t>
             </a:fld>
             <a:endParaRPr lang="en-US" dirty="0"/>
           </a:p>
@@ -27268,6 +27268,25 @@
             </a:pPr>
             <a:r>
               <a:rPr lang="en-US" sz="2200" dirty="0"/>
+              <a:t>Split into two </a:t>
+            </a:r>
+            <a:r>
+              <a:rPr lang="en-US" sz="2200"/>
+              <a:t>drafts concentrating </a:t>
+            </a:r>
+            <a:r>
+              <a:rPr lang="en-US" sz="2200" dirty="0"/>
+              <a:t>on the distinct use cases, depending on WG view</a:t>
+            </a:r>
+          </a:p>
+          <a:p>
+            <a:pPr>
+              <a:lnSpc>
+                <a:spcPct val="100000"/>
+              </a:lnSpc>
+            </a:pPr>
+            <a:r>
+              <a:rPr lang="en-US" sz="2200" dirty="0"/>
               <a:t>Circulate outcome on the mailing list for further discussion</a:t>
             </a:r>
           </a:p>
@@ -27419,7 +27438,7 @@
             <a:fld id="{8C792E63-5F21-4F54-A864-D84D9F273FCA}" type="datetimeFigureOut">
               <a:rPr lang="en-US" smtClean="0"/>
               <a:pPr/>
-              <a:t>7/20/2021</a:t>
+              <a:t>7/21/2021</a:t>
             </a:fld>
             <a:endParaRPr lang="en-US" dirty="0"/>
           </a:p>
@@ -32164,7 +32183,7 @@
             <a:fld id="{8C792E63-5F21-4F54-A864-D84D9F273FCA}" type="datetimeFigureOut">
               <a:rPr lang="en-US" smtClean="0"/>
               <a:pPr/>
-              <a:t>7/20/2021</a:t>
+              <a:t>7/21/2021</a:t>
             </a:fld>
             <a:endParaRPr lang="en-US"/>
           </a:p>
@@ -37679,7 +37698,7 @@
             <a:fld id="{8C792E63-5F21-4F54-A864-D84D9F273FCA}" type="datetimeFigureOut">
               <a:rPr lang="en-US" smtClean="0"/>
               <a:pPr/>
-              <a:t>7/20/2021</a:t>
+              <a:t>7/21/2021</a:t>
             </a:fld>
             <a:endParaRPr lang="en-US" dirty="0"/>
           </a:p>
@@ -38010,7 +38029,7 @@
             <a:fld id="{8C792E63-5F21-4F54-A864-D84D9F273FCA}" type="datetimeFigureOut">
               <a:rPr lang="en-US" smtClean="0"/>
               <a:pPr/>
-              <a:t>7/20/2021</a:t>
+              <a:t>7/21/2021</a:t>
             </a:fld>
             <a:endParaRPr lang="en-US" dirty="0"/>
           </a:p>
@@ -39665,7 +39684,7 @@
             <a:fld id="{8C792E63-5F21-4F54-A864-D84D9F273FCA}" type="datetimeFigureOut">
               <a:rPr lang="en-US" smtClean="0"/>
               <a:pPr/>
-              <a:t>7/20/2021</a:t>
+              <a:t>7/21/2021</a:t>
             </a:fld>
             <a:endParaRPr lang="en-US" dirty="0"/>
           </a:p>
@@ -40772,7 +40791,7 @@
             <a:fld id="{8C792E63-5F21-4F54-A864-D84D9F273FCA}" type="datetimeFigureOut">
               <a:rPr lang="en-US" smtClean="0"/>
               <a:pPr/>
-              <a:t>7/20/2021</a:t>
+              <a:t>7/21/2021</a:t>
             </a:fld>
             <a:endParaRPr lang="en-US" dirty="0"/>
           </a:p>
@@ -42046,7 +42065,7 @@
             <a:fld id="{8C792E63-5F21-4F54-A864-D84D9F273FCA}" type="datetimeFigureOut">
               <a:rPr lang="en-US" smtClean="0"/>
               <a:pPr/>
-              <a:t>7/20/2021</a:t>
+              <a:t>7/21/2021</a:t>
             </a:fld>
             <a:endParaRPr lang="en-US" dirty="0"/>
           </a:p>

</xml_diff>

<commit_message>
updated descritpion regarding SZTP-CSR  on slide 4
</commit_message>
<xml_diff>
--- a/presentations/slides-111-BRSKI-AE.pptx
+++ b/presentations/slides-111-BRSKI-AE.pptx
@@ -37560,13 +37560,13 @@
               <a:rPr lang="en-US" sz="2200" dirty="0" err="1">
                 <a:sym typeface="Wingdings" panose="05000000000000000000" pitchFamily="2" charset="2"/>
               </a:rPr>
-              <a:t>ietf-csr-types.yang</a:t>
+              <a:t>csr</a:t>
             </a:r>
             <a:r>
               <a:rPr lang="en-US" sz="2200" dirty="0">
                 <a:sym typeface="Wingdings" panose="05000000000000000000" pitchFamily="2" charset="2"/>
               </a:rPr>
-              <a:t> as part of SZTP-CSR</a:t>
+              <a:t> types independent of the embedding protocol as part of SZTP-CSR is currently discussed </a:t>
             </a:r>
             <a:endParaRPr lang="en-US" sz="2200" dirty="0"/>
           </a:p>

</xml_diff>

<commit_message>
updates slides to link to accepted WG document for JWS signed voucher
</commit_message>
<xml_diff>
--- a/presentations/slides-111-BRSKI-AE.pptx
+++ b/presentations/slides-111-BRSKI-AE.pptx
@@ -258,7 +258,7 @@
           <a:p>
             <a:fld id="{33B5B5E8-CA78-4A82-83A0-867EF5A818AE}" type="datetimeFigureOut">
               <a:rPr lang="en-US" smtClean="0"/>
-              <a:t>7/21/2021</a:t>
+              <a:t>7/27/2021</a:t>
             </a:fld>
             <a:endParaRPr lang="en-US"/>
           </a:p>
@@ -2583,7 +2583,7 @@
           <a:p>
             <a:fld id="{8C792E63-5F21-4F54-A864-D84D9F273FCA}" type="datetimeFigureOut">
               <a:rPr lang="en-US" smtClean="0"/>
-              <a:t>7/21/2021</a:t>
+              <a:t>7/27/2021</a:t>
             </a:fld>
             <a:endParaRPr lang="en-US" dirty="0"/>
           </a:p>
@@ -2801,7 +2801,7 @@
           <a:p>
             <a:fld id="{8C792E63-5F21-4F54-A864-D84D9F273FCA}" type="datetimeFigureOut">
               <a:rPr lang="en-US" smtClean="0"/>
-              <a:t>7/21/2021</a:t>
+              <a:t>7/27/2021</a:t>
             </a:fld>
             <a:endParaRPr lang="en-US"/>
           </a:p>
@@ -3025,7 +3025,7 @@
           <a:p>
             <a:fld id="{8C792E63-5F21-4F54-A864-D84D9F273FCA}" type="datetimeFigureOut">
               <a:rPr lang="en-US" smtClean="0"/>
-              <a:t>7/21/2021</a:t>
+              <a:t>7/27/2021</a:t>
             </a:fld>
             <a:endParaRPr lang="en-US"/>
           </a:p>
@@ -3239,7 +3239,7 @@
           <a:p>
             <a:fld id="{8C792E63-5F21-4F54-A864-D84D9F273FCA}" type="datetimeFigureOut">
               <a:rPr lang="en-US" smtClean="0"/>
-              <a:t>7/21/2021</a:t>
+              <a:t>7/27/2021</a:t>
             </a:fld>
             <a:endParaRPr lang="en-US"/>
           </a:p>
@@ -3530,7 +3530,7 @@
           <a:p>
             <a:fld id="{8C792E63-5F21-4F54-A864-D84D9F273FCA}" type="datetimeFigureOut">
               <a:rPr lang="en-US" smtClean="0"/>
-              <a:t>7/21/2021</a:t>
+              <a:t>7/27/2021</a:t>
             </a:fld>
             <a:endParaRPr lang="en-US"/>
           </a:p>
@@ -3811,7 +3811,7 @@
           <a:p>
             <a:fld id="{8C792E63-5F21-4F54-A864-D84D9F273FCA}" type="datetimeFigureOut">
               <a:rPr lang="en-US" smtClean="0"/>
-              <a:t>7/21/2021</a:t>
+              <a:t>7/27/2021</a:t>
             </a:fld>
             <a:endParaRPr lang="en-US"/>
           </a:p>
@@ -4239,7 +4239,7 @@
           <a:p>
             <a:fld id="{8C792E63-5F21-4F54-A864-D84D9F273FCA}" type="datetimeFigureOut">
               <a:rPr lang="en-US" smtClean="0"/>
-              <a:t>7/21/2021</a:t>
+              <a:t>7/27/2021</a:t>
             </a:fld>
             <a:endParaRPr lang="en-US"/>
           </a:p>
@@ -4396,7 +4396,7 @@
           <a:p>
             <a:fld id="{8C792E63-5F21-4F54-A864-D84D9F273FCA}" type="datetimeFigureOut">
               <a:rPr lang="en-US" smtClean="0"/>
-              <a:t>7/21/2021</a:t>
+              <a:t>7/27/2021</a:t>
             </a:fld>
             <a:endParaRPr lang="en-US"/>
           </a:p>
@@ -4525,7 +4525,7 @@
           <a:p>
             <a:fld id="{8C792E63-5F21-4F54-A864-D84D9F273FCA}" type="datetimeFigureOut">
               <a:rPr lang="en-US" smtClean="0"/>
-              <a:t>7/21/2021</a:t>
+              <a:t>7/27/2021</a:t>
             </a:fld>
             <a:endParaRPr lang="en-US"/>
           </a:p>
@@ -4852,7 +4852,7 @@
           <a:p>
             <a:fld id="{8C792E63-5F21-4F54-A864-D84D9F273FCA}" type="datetimeFigureOut">
               <a:rPr lang="en-US" smtClean="0"/>
-              <a:t>7/21/2021</a:t>
+              <a:t>7/27/2021</a:t>
             </a:fld>
             <a:endParaRPr lang="en-US"/>
           </a:p>
@@ -5156,7 +5156,7 @@
           <a:p>
             <a:fld id="{8C792E63-5F21-4F54-A864-D84D9F273FCA}" type="datetimeFigureOut">
               <a:rPr lang="en-US" smtClean="0"/>
-              <a:t>7/21/2021</a:t>
+              <a:t>7/27/2021</a:t>
             </a:fld>
             <a:endParaRPr lang="en-US"/>
           </a:p>
@@ -5448,7 +5448,7 @@
           <a:p>
             <a:fld id="{8C792E63-5F21-4F54-A864-D84D9F273FCA}" type="datetimeFigureOut">
               <a:rPr lang="en-US" smtClean="0"/>
-              <a:t>7/21/2021</a:t>
+              <a:t>7/27/2021</a:t>
             </a:fld>
             <a:endParaRPr lang="en-US"/>
           </a:p>
@@ -7296,7 +7296,7 @@
             <a:fld id="{8C792E63-5F21-4F54-A864-D84D9F273FCA}" type="datetimeFigureOut">
               <a:rPr lang="en-US" smtClean="0"/>
               <a:pPr/>
-              <a:t>7/21/2021</a:t>
+              <a:t>7/27/2021</a:t>
             </a:fld>
             <a:endParaRPr lang="en-US" dirty="0"/>
           </a:p>
@@ -9351,7 +9351,7 @@
             <a:fld id="{8C792E63-5F21-4F54-A864-D84D9F273FCA}" type="datetimeFigureOut">
               <a:rPr lang="en-US" smtClean="0"/>
               <a:pPr/>
-              <a:t>7/21/2021</a:t>
+              <a:t>7/27/2021</a:t>
             </a:fld>
             <a:endParaRPr lang="en-US" dirty="0"/>
           </a:p>
@@ -10514,7 +10514,7 @@
             <a:fld id="{8C792E63-5F21-4F54-A864-D84D9F273FCA}" type="datetimeFigureOut">
               <a:rPr lang="en-US" smtClean="0"/>
               <a:pPr/>
-              <a:t>7/21/2021</a:t>
+              <a:t>7/27/2021</a:t>
             </a:fld>
             <a:endParaRPr lang="en-US" dirty="0"/>
           </a:p>
@@ -12219,7 +12219,7 @@
             <a:fld id="{8C792E63-5F21-4F54-A864-D84D9F273FCA}" type="datetimeFigureOut">
               <a:rPr lang="en-US" smtClean="0"/>
               <a:pPr/>
-              <a:t>7/21/2021</a:t>
+              <a:t>7/27/2021</a:t>
             </a:fld>
             <a:endParaRPr lang="en-US" dirty="0"/>
           </a:p>
@@ -14086,7 +14086,7 @@
             <a:fld id="{8C792E63-5F21-4F54-A864-D84D9F273FCA}" type="datetimeFigureOut">
               <a:rPr lang="en-US" smtClean="0"/>
               <a:pPr/>
-              <a:t>7/21/2021</a:t>
+              <a:t>7/27/2021</a:t>
             </a:fld>
             <a:endParaRPr lang="en-US" dirty="0"/>
           </a:p>
@@ -15334,7 +15334,7 @@
             <a:fld id="{8C792E63-5F21-4F54-A864-D84D9F273FCA}" type="datetimeFigureOut">
               <a:rPr lang="en-US" smtClean="0"/>
               <a:pPr/>
-              <a:t>7/21/2021</a:t>
+              <a:t>7/27/2021</a:t>
             </a:fld>
             <a:endParaRPr lang="en-US" dirty="0"/>
           </a:p>
@@ -16582,7 +16582,7 @@
             <a:fld id="{8C792E63-5F21-4F54-A864-D84D9F273FCA}" type="datetimeFigureOut">
               <a:rPr lang="en-US" smtClean="0"/>
               <a:pPr/>
-              <a:t>7/21/2021</a:t>
+              <a:t>7/27/2021</a:t>
             </a:fld>
             <a:endParaRPr lang="en-US" dirty="0"/>
           </a:p>
@@ -18228,7 +18228,7 @@
             <a:fld id="{8C792E63-5F21-4F54-A864-D84D9F273FCA}" type="datetimeFigureOut">
               <a:rPr lang="en-US" smtClean="0"/>
               <a:pPr/>
-              <a:t>7/21/2021</a:t>
+              <a:t>7/27/2021</a:t>
             </a:fld>
             <a:endParaRPr lang="en-US" dirty="0"/>
           </a:p>
@@ -19523,7 +19523,7 @@
             <a:fld id="{8C792E63-5F21-4F54-A864-D84D9F273FCA}" type="datetimeFigureOut">
               <a:rPr lang="en-US" smtClean="0"/>
               <a:pPr/>
-              <a:t>7/21/2021</a:t>
+              <a:t>7/27/2021</a:t>
             </a:fld>
             <a:endParaRPr lang="en-US" dirty="0"/>
           </a:p>
@@ -20766,7 +20766,7 @@
             <a:fld id="{8C792E63-5F21-4F54-A864-D84D9F273FCA}" type="datetimeFigureOut">
               <a:rPr lang="en-US" smtClean="0"/>
               <a:pPr/>
-              <a:t>7/21/2021</a:t>
+              <a:t>7/27/2021</a:t>
             </a:fld>
             <a:endParaRPr lang="en-US" dirty="0"/>
           </a:p>
@@ -21206,7 +21206,7 @@
             <a:fld id="{8C792E63-5F21-4F54-A864-D84D9F273FCA}" type="datetimeFigureOut">
               <a:rPr lang="en-US" smtClean="0"/>
               <a:pPr/>
-              <a:t>7/21/2021</a:t>
+              <a:t>7/27/2021</a:t>
             </a:fld>
             <a:endParaRPr lang="en-US" dirty="0"/>
           </a:p>
@@ -22449,7 +22449,7 @@
             <a:fld id="{8C792E63-5F21-4F54-A864-D84D9F273FCA}" type="datetimeFigureOut">
               <a:rPr lang="en-US" smtClean="0"/>
               <a:pPr/>
-              <a:t>7/21/2021</a:t>
+              <a:t>7/27/2021</a:t>
             </a:fld>
             <a:endParaRPr lang="en-US" dirty="0"/>
           </a:p>
@@ -23361,7 +23361,7 @@
             <a:fld id="{8C792E63-5F21-4F54-A864-D84D9F273FCA}" type="datetimeFigureOut">
               <a:rPr lang="en-US" smtClean="0"/>
               <a:pPr/>
-              <a:t>7/21/2021</a:t>
+              <a:t>7/27/2021</a:t>
             </a:fld>
             <a:endParaRPr lang="en-US" dirty="0"/>
           </a:p>
@@ -24408,7 +24408,7 @@
             <a:fld id="{8C792E63-5F21-4F54-A864-D84D9F273FCA}" type="datetimeFigureOut">
               <a:rPr lang="en-US" smtClean="0"/>
               <a:pPr/>
-              <a:t>7/21/2021</a:t>
+              <a:t>7/27/2021</a:t>
             </a:fld>
             <a:endParaRPr lang="en-US" dirty="0"/>
           </a:p>
@@ -25593,7 +25593,7 @@
             <a:fld id="{8C792E63-5F21-4F54-A864-D84D9F273FCA}" type="datetimeFigureOut">
               <a:rPr lang="en-US" smtClean="0"/>
               <a:pPr/>
-              <a:t>7/21/2021</a:t>
+              <a:t>7/27/2021</a:t>
             </a:fld>
             <a:endParaRPr lang="en-US" dirty="0"/>
           </a:p>
@@ -25926,7 +25926,7 @@
             </a:pPr>
             <a:r>
               <a:rPr lang="en-US" sz="1800" dirty="0"/>
-              <a:t>“proximity” is a statement that the proximity-registrar-certificate was received directly (via TLS) and that the pledge could verify proof-of-possession during the TLS handshake before voucher-request creation.</a:t>
+              <a:t>“proximity” refers to proximity-registrar-certificate was received directly (via TLS) and that the pledge could verify proof-of-possession during the TLS handshake before voucher-request creation.</a:t>
             </a:r>
           </a:p>
         </p:txBody>
@@ -26057,7 +26057,7 @@
             <a:fld id="{8C792E63-5F21-4F54-A864-D84D9F273FCA}" type="datetimeFigureOut">
               <a:rPr lang="en-US" smtClean="0"/>
               <a:pPr/>
-              <a:t>7/21/2021</a:t>
+              <a:t>7/27/2021</a:t>
             </a:fld>
             <a:endParaRPr lang="en-US" dirty="0"/>
           </a:p>
@@ -26549,7 +26549,7 @@
             <a:fld id="{8C792E63-5F21-4F54-A864-D84D9F273FCA}" type="datetimeFigureOut">
               <a:rPr lang="en-US" smtClean="0"/>
               <a:pPr/>
-              <a:t>7/21/2021</a:t>
+              <a:t>7/27/2021</a:t>
             </a:fld>
             <a:endParaRPr lang="en-US" dirty="0"/>
           </a:p>
@@ -27002,7 +27002,7 @@
             <a:fld id="{8C792E63-5F21-4F54-A864-D84D9F273FCA}" type="datetimeFigureOut">
               <a:rPr lang="en-US" smtClean="0"/>
               <a:pPr/>
-              <a:t>7/21/2021</a:t>
+              <a:t>7/27/2021</a:t>
             </a:fld>
             <a:endParaRPr lang="en-US" dirty="0"/>
           </a:p>
@@ -27438,7 +27438,7 @@
             <a:fld id="{8C792E63-5F21-4F54-A864-D84D9F273FCA}" type="datetimeFigureOut">
               <a:rPr lang="en-US" smtClean="0"/>
               <a:pPr/>
-              <a:t>7/21/2021</a:t>
+              <a:t>7/27/2021</a:t>
             </a:fld>
             <a:endParaRPr lang="en-US" dirty="0"/>
           </a:p>
@@ -31998,17 +31998,17 @@
             </a:pPr>
             <a:r>
               <a:rPr lang="en-US" sz="2200" dirty="0"/>
-              <a:t>Defined detailed call flow and exchanged objects for interactions in UC2 between pledge – registrar-agent – registrar and MASA.  Object format aligns with </a:t>
+              <a:t>Defined detailed call flow and exchanged objects for interactions in UC2 between pledge – registrar-agent – registrar and MASA.  Object format aligns with proposed format in </a:t>
             </a:r>
             <a:r>
               <a:rPr lang="en-US" sz="2200" dirty="0">
                 <a:hlinkClick r:id="rId3"/>
               </a:rPr>
-              <a:t>draft JOSE signed voucher artifacts </a:t>
+              <a:t>draft JWS signed Voucher Artifacts</a:t>
             </a:r>
             <a:r>
               <a:rPr lang="en-US" sz="2200" dirty="0"/>
-              <a:t>(Section 5.2.3).</a:t>
+              <a:t> (Section 5.2.3).</a:t>
             </a:r>
           </a:p>
           <a:p>
@@ -32183,7 +32183,7 @@
             <a:fld id="{8C792E63-5F21-4F54-A864-D84D9F273FCA}" type="datetimeFigureOut">
               <a:rPr lang="en-US" smtClean="0"/>
               <a:pPr/>
-              <a:t>7/21/2021</a:t>
+              <a:t>7/27/2021</a:t>
             </a:fld>
             <a:endParaRPr lang="en-US"/>
           </a:p>
@@ -37698,7 +37698,7 @@
             <a:fld id="{8C792E63-5F21-4F54-A864-D84D9F273FCA}" type="datetimeFigureOut">
               <a:rPr lang="en-US" smtClean="0"/>
               <a:pPr/>
-              <a:t>7/21/2021</a:t>
+              <a:t>7/27/2021</a:t>
             </a:fld>
             <a:endParaRPr lang="en-US" dirty="0"/>
           </a:p>
@@ -38029,7 +38029,7 @@
             <a:fld id="{8C792E63-5F21-4F54-A864-D84D9F273FCA}" type="datetimeFigureOut">
               <a:rPr lang="en-US" smtClean="0"/>
               <a:pPr/>
-              <a:t>7/21/2021</a:t>
+              <a:t>7/27/2021</a:t>
             </a:fld>
             <a:endParaRPr lang="en-US" dirty="0"/>
           </a:p>
@@ -39684,7 +39684,7 @@
             <a:fld id="{8C792E63-5F21-4F54-A864-D84D9F273FCA}" type="datetimeFigureOut">
               <a:rPr lang="en-US" smtClean="0"/>
               <a:pPr/>
-              <a:t>7/21/2021</a:t>
+              <a:t>7/27/2021</a:t>
             </a:fld>
             <a:endParaRPr lang="en-US" dirty="0"/>
           </a:p>
@@ -40791,7 +40791,7 @@
             <a:fld id="{8C792E63-5F21-4F54-A864-D84D9F273FCA}" type="datetimeFigureOut">
               <a:rPr lang="en-US" smtClean="0"/>
               <a:pPr/>
-              <a:t>7/21/2021</a:t>
+              <a:t>7/27/2021</a:t>
             </a:fld>
             <a:endParaRPr lang="en-US" dirty="0"/>
           </a:p>
@@ -42065,7 +42065,7 @@
             <a:fld id="{8C792E63-5F21-4F54-A864-D84D9F273FCA}" type="datetimeFigureOut">
               <a:rPr lang="en-US" smtClean="0"/>
               <a:pPr/>
-              <a:t>7/21/2021</a:t>
+              <a:t>7/27/2021</a:t>
             </a:fld>
             <a:endParaRPr lang="en-US" dirty="0"/>
           </a:p>

</xml_diff>